<commit_message>
Lecture 17 solution added
</commit_message>
<xml_diff>
--- a/Lecture Notes-Slides/Lecture 17.pptx
+++ b/Lecture Notes-Slides/Lecture 17.pptx
@@ -4092,31 +4092,7 @@
           <a:p>
             <a:r>
               <a:rPr lang="en-US" dirty="0" smtClean="0"/>
-              <a:t>What </a:t>
-            </a:r>
-            <a:r>
-              <a:rPr lang="en-US" dirty="0" smtClean="0"/>
-              <a:t>does dictate </a:t>
-            </a:r>
-            <a:r>
-              <a:rPr lang="en-US" dirty="0" smtClean="0"/>
-              <a:t>the type of NB model you can </a:t>
-            </a:r>
-            <a:r>
-              <a:rPr lang="en-US" dirty="0" smtClean="0"/>
-              <a:t>use? The answer is your </a:t>
-            </a:r>
-            <a:r>
-              <a:rPr lang="en-US" dirty="0" smtClean="0"/>
-              <a:t>feature types. Depending on </a:t>
-            </a:r>
-            <a:r>
-              <a:rPr lang="en-US" dirty="0" smtClean="0"/>
-              <a:t>features, </a:t>
-            </a:r>
-            <a:r>
-              <a:rPr lang="en-US" dirty="0" smtClean="0"/>
-              <a:t>you can use 3 different NB models: Gaussian, Bernoulli, and Multinomial</a:t>
+              <a:t>What does dictate the type of NB model you can use? The answer is your feature types. Depending on features, you can use 3 different NB models: Gaussian, Bernoulli, and Multinomial</a:t>
             </a:r>
           </a:p>
           <a:p>
@@ -4520,37 +4496,8 @@
           <a:p>
             <a:r>
               <a:rPr lang="en-US" dirty="0" smtClean="0"/>
-              <a:t>You </a:t>
-            </a:r>
-            <a:r>
-              <a:rPr lang="en-US" dirty="0" smtClean="0"/>
-              <a:t>should make </a:t>
-            </a:r>
-            <a:r>
-              <a:rPr lang="en-US" dirty="0" smtClean="0"/>
-              <a:t>sure, your input features either look normal at their raw format, </a:t>
-            </a:r>
-            <a:r>
-              <a:rPr lang="en-US" dirty="0" smtClean="0"/>
-              <a:t>or look normal </a:t>
-            </a:r>
-            <a:r>
-              <a:rPr lang="en-US" dirty="0" smtClean="0"/>
-              <a:t>after transformation. For instance you can use log transform to make most of </a:t>
-            </a:r>
-            <a:r>
-              <a:rPr lang="en-US" dirty="0" smtClean="0"/>
-              <a:t>positively skewed </a:t>
-            </a:r>
-            <a:r>
-              <a:rPr lang="en-US" dirty="0" smtClean="0"/>
-              <a:t>distributions, </a:t>
-            </a:r>
-            <a:r>
-              <a:rPr lang="en-US" dirty="0" smtClean="0"/>
-              <a:t>symmetric.</a:t>
-            </a:r>
-            <a:endParaRPr lang="en-US" dirty="0" smtClean="0"/>
+              <a:t>You should make sure, your input features either look normal at their raw format, or look normal after transformation. For instance you can use log transform to make most of positively skewed distributions, symmetric.</a:t>
+            </a:r>
           </a:p>
           <a:p>
             <a:r>
@@ -4950,13 +4897,8 @@
           <a:p>
             <a:r>
               <a:rPr lang="en-US" dirty="0" smtClean="0"/>
-              <a:t>One of the fastest </a:t>
-            </a:r>
-            <a:r>
-              <a:rPr lang="en-US" dirty="0" smtClean="0"/>
-              <a:t>algorithms</a:t>
-            </a:r>
-            <a:endParaRPr lang="en-US" dirty="0" smtClean="0"/>
+              <a:t>One of the fastest algorithms</a:t>
+            </a:r>
           </a:p>
           <a:p>
             <a:r>
@@ -5397,19 +5339,7 @@
             </a:r>
             <a:r>
               <a:rPr lang="en-US" dirty="0" smtClean="0"/>
-              <a:t> </a:t>
-            </a:r>
-            <a:r>
-              <a:rPr lang="en-US" dirty="0" smtClean="0"/>
-              <a:t>works under the assumption that your inputs are normally distributed. If that is not the </a:t>
-            </a:r>
-            <a:r>
-              <a:rPr lang="en-US" dirty="0" smtClean="0"/>
-              <a:t>case, </a:t>
-            </a:r>
-            <a:r>
-              <a:rPr lang="en-US" dirty="0" smtClean="0"/>
-              <a:t>you either cannot use it or need to transform your variables. </a:t>
+              <a:t> works under the assumption that your inputs are normally distributed. If that is not the case, you either cannot use it or need to transform your variables. </a:t>
             </a:r>
           </a:p>
           <a:p>
@@ -6049,8 +5979,17 @@
           <a:p>
             <a:r>
               <a:rPr lang="en-US" dirty="0" smtClean="0"/>
-              <a:t>Advantages and disadvantages of using NB?</a:t>
-            </a:r>
+              <a:t>Advantages and disadvantages of </a:t>
+            </a:r>
+            <a:r>
+              <a:rPr lang="en-US" smtClean="0"/>
+              <a:t>using </a:t>
+            </a:r>
+            <a:r>
+              <a:rPr lang="en-US" smtClean="0"/>
+              <a:t>NB</a:t>
+            </a:r>
+            <a:endParaRPr lang="en-US" dirty="0" smtClean="0"/>
           </a:p>
           <a:p>
             <a:r>
@@ -7193,12 +7132,12 @@
           <a:graphicData uri="http://schemas.openxmlformats.org/presentationml/2006/ole">
             <mc:AlternateContent xmlns:mc="http://schemas.openxmlformats.org/markup-compatibility/2006">
               <mc:Choice xmlns:v="urn:schemas-microsoft-com:vml" Requires="v">
-                <p:oleObj spid="_x0000_s3083" name="Document" r:id="rId4" imgW="7128360" imgH="5781600" progId="Word.Document.8">
+                <p:oleObj spid="_x0000_s3085" name="Document" r:id="rId5" imgW="7128360" imgH="5781600" progId="Word.Document.8">
                   <p:embed/>
                 </p:oleObj>
               </mc:Choice>
               <mc:Fallback>
-                <p:oleObj name="Document" r:id="rId4" imgW="7128360" imgH="5781600" progId="Word.Document.8">
+                <p:oleObj name="Document" r:id="rId5" imgW="7128360" imgH="5781600" progId="Word.Document.8">
                   <p:embed/>
                   <p:pic>
                     <p:nvPicPr>
@@ -7209,7 +7148,7 @@
                       <p:nvPr/>
                     </p:nvPicPr>
                     <p:blipFill>
-                      <a:blip r:embed="rId5">
+                      <a:blip r:embed="rId6">
                         <a:extLst>
                           <a:ext uri="{28A0092B-C50C-407E-A947-70E740481C1C}">
                             <a14:useLocalDpi xmlns:a14="http://schemas.microsoft.com/office/drawing/2010/main" val="0"/>
@@ -7336,15 +7275,7 @@
             </a:r>
             <a:r>
               <a:rPr lang="en-US" sz="2400" dirty="0" smtClean="0"/>
-              <a:t>what</a:t>
-            </a:r>
-            <a:r>
-              <a:rPr lang="en-US" sz="2400" dirty="0" smtClean="0"/>
-              <a:t>’</a:t>
-            </a:r>
-            <a:r>
-              <a:rPr lang="en-US" sz="2400" dirty="0" smtClean="0"/>
-              <a:t>s </a:t>
+              <a:t>what’s </a:t>
             </a:r>
             <a:r>
               <a:rPr lang="en-US" sz="2400" dirty="0"/>
@@ -7435,7 +7366,7 @@
           <a:graphicData uri="http://schemas.openxmlformats.org/presentationml/2006/ole">
             <mc:AlternateContent xmlns:mc="http://schemas.openxmlformats.org/markup-compatibility/2006">
               <mc:Choice xmlns:v="urn:schemas-microsoft-com:vml" Requires="v">
-                <p:oleObj spid="_x0000_s6155" name="Equation" r:id="rId3" imgW="4267200" imgH="1803400" progId="Equation.3">
+                <p:oleObj spid="_x0000_s6157" name="Equation" r:id="rId3" imgW="4267200" imgH="1803400" progId="Equation.3">
                   <p:embed/>
                 </p:oleObj>
               </mc:Choice>
@@ -7909,15 +7840,7 @@
           <a:p>
             <a:r>
               <a:rPr lang="en-US" dirty="0" smtClean="0"/>
-              <a:t>Use 1 nearest neighbor algorithm and locate the closest classmate to you. Once you locate him/her, </a:t>
-            </a:r>
-            <a:r>
-              <a:rPr lang="en-US" dirty="0" smtClean="0"/>
-              <a:t>discuss how </a:t>
-            </a:r>
-            <a:r>
-              <a:rPr lang="en-US" dirty="0" smtClean="0"/>
-              <a:t>one could use Naïve Bayes classifier to classify Spam and Ham e-mail. Also, discuss how we can measure the error of this algorithm and what can go wrong.</a:t>
+              <a:t>Use 1 nearest neighbor algorithm and locate the closest classmate to you. Once you locate him/her, discuss how one could use Naïve Bayes classifier to classify Spam and Ham e-mail. Also, discuss how we can measure the error of this algorithm and what can go wrong.</a:t>
             </a:r>
             <a:endParaRPr lang="en-US" dirty="0"/>
           </a:p>

</xml_diff>